<commit_message>
test multi-cloud config setup
</commit_message>
<xml_diff>
--- a/project/polarVortexV2_flowchart.pptx
+++ b/project/polarVortexV2_flowchart.pptx
@@ -107,6 +107,11 @@
       </a:defRPr>
     </a:lvl9pPr>
   </p:defaultTextStyle>
+  <p:extLst>
+    <p:ext uri="{EFAFB233-063F-42B5-8137-9DF3F51BA10A}">
+      <p15:sldGuideLst xmlns:p15="http://schemas.microsoft.com/office/powerpoint/2012/main"/>
+    </p:ext>
+  </p:extLst>
 </p:presentation>
 </file>
 
@@ -192,7 +197,7 @@
           <a:p>
             <a:fld id="{F3BF1CDA-0E3E-744E-A823-E05810B250A0}" type="datetimeFigureOut">
               <a:rPr lang="en-VN" smtClean="0"/>
-              <a:t>14/7/25</a:t>
+              <a:t>11/9/25</a:t>
             </a:fld>
             <a:endParaRPr lang="en-VN"/>
           </a:p>
@@ -680,7 +685,7 @@
           <a:p>
             <a:fld id="{1977AAD9-701A-2842-A60D-A2F4FFEFDB6C}" type="datetimeFigureOut">
               <a:rPr lang="en-VN" smtClean="0"/>
-              <a:t>14/7/25</a:t>
+              <a:t>11/9/25</a:t>
             </a:fld>
             <a:endParaRPr lang="en-VN"/>
           </a:p>
@@ -850,7 +855,7 @@
           <a:p>
             <a:fld id="{1977AAD9-701A-2842-A60D-A2F4FFEFDB6C}" type="datetimeFigureOut">
               <a:rPr lang="en-VN" smtClean="0"/>
-              <a:t>14/7/25</a:t>
+              <a:t>11/9/25</a:t>
             </a:fld>
             <a:endParaRPr lang="en-VN"/>
           </a:p>
@@ -1030,7 +1035,7 @@
           <a:p>
             <a:fld id="{1977AAD9-701A-2842-A60D-A2F4FFEFDB6C}" type="datetimeFigureOut">
               <a:rPr lang="en-VN" smtClean="0"/>
-              <a:t>14/7/25</a:t>
+              <a:t>11/9/25</a:t>
             </a:fld>
             <a:endParaRPr lang="en-VN"/>
           </a:p>
@@ -1200,7 +1205,7 @@
           <a:p>
             <a:fld id="{1977AAD9-701A-2842-A60D-A2F4FFEFDB6C}" type="datetimeFigureOut">
               <a:rPr lang="en-VN" smtClean="0"/>
-              <a:t>14/7/25</a:t>
+              <a:t>11/9/25</a:t>
             </a:fld>
             <a:endParaRPr lang="en-VN"/>
           </a:p>
@@ -1444,7 +1449,7 @@
           <a:p>
             <a:fld id="{1977AAD9-701A-2842-A60D-A2F4FFEFDB6C}" type="datetimeFigureOut">
               <a:rPr lang="en-VN" smtClean="0"/>
-              <a:t>14/7/25</a:t>
+              <a:t>11/9/25</a:t>
             </a:fld>
             <a:endParaRPr lang="en-VN"/>
           </a:p>
@@ -1676,7 +1681,7 @@
           <a:p>
             <a:fld id="{1977AAD9-701A-2842-A60D-A2F4FFEFDB6C}" type="datetimeFigureOut">
               <a:rPr lang="en-VN" smtClean="0"/>
-              <a:t>14/7/25</a:t>
+              <a:t>11/9/25</a:t>
             </a:fld>
             <a:endParaRPr lang="en-VN"/>
           </a:p>
@@ -2043,7 +2048,7 @@
           <a:p>
             <a:fld id="{1977AAD9-701A-2842-A60D-A2F4FFEFDB6C}" type="datetimeFigureOut">
               <a:rPr lang="en-VN" smtClean="0"/>
-              <a:t>14/7/25</a:t>
+              <a:t>11/9/25</a:t>
             </a:fld>
             <a:endParaRPr lang="en-VN"/>
           </a:p>
@@ -2161,7 +2166,7 @@
           <a:p>
             <a:fld id="{1977AAD9-701A-2842-A60D-A2F4FFEFDB6C}" type="datetimeFigureOut">
               <a:rPr lang="en-VN" smtClean="0"/>
-              <a:t>14/7/25</a:t>
+              <a:t>11/9/25</a:t>
             </a:fld>
             <a:endParaRPr lang="en-VN"/>
           </a:p>
@@ -2256,7 +2261,7 @@
           <a:p>
             <a:fld id="{1977AAD9-701A-2842-A60D-A2F4FFEFDB6C}" type="datetimeFigureOut">
               <a:rPr lang="en-VN" smtClean="0"/>
-              <a:t>14/7/25</a:t>
+              <a:t>11/9/25</a:t>
             </a:fld>
             <a:endParaRPr lang="en-VN"/>
           </a:p>
@@ -2533,7 +2538,7 @@
           <a:p>
             <a:fld id="{1977AAD9-701A-2842-A60D-A2F4FFEFDB6C}" type="datetimeFigureOut">
               <a:rPr lang="en-VN" smtClean="0"/>
-              <a:t>14/7/25</a:t>
+              <a:t>11/9/25</a:t>
             </a:fld>
             <a:endParaRPr lang="en-VN"/>
           </a:p>
@@ -2790,7 +2795,7 @@
           <a:p>
             <a:fld id="{1977AAD9-701A-2842-A60D-A2F4FFEFDB6C}" type="datetimeFigureOut">
               <a:rPr lang="en-VN" smtClean="0"/>
-              <a:t>14/7/25</a:t>
+              <a:t>11/9/25</a:t>
             </a:fld>
             <a:endParaRPr lang="en-VN"/>
           </a:p>
@@ -3003,7 +3008,7 @@
           <a:p>
             <a:fld id="{1977AAD9-701A-2842-A60D-A2F4FFEFDB6C}" type="datetimeFigureOut">
               <a:rPr lang="en-VN" smtClean="0"/>
-              <a:t>14/7/25</a:t>
+              <a:t>11/9/25</a:t>
             </a:fld>
             <a:endParaRPr lang="en-VN"/>
           </a:p>
@@ -3464,7 +3469,7 @@
         <p:spPr>
           <a:xfrm>
             <a:off x="6200086" y="2959698"/>
-            <a:ext cx="2195166" cy="1230481"/>
+            <a:ext cx="2195166" cy="973366"/>
           </a:xfrm>
           <a:prstGeom prst="snip2DiagRect">
             <a:avLst/>
@@ -3485,7 +3490,7 @@
             <a:pPr algn="ctr"/>
             <a:r>
               <a:rPr lang="en-VN" sz="1400" dirty="0"/>
-              <a:t>Thermal contribution function: CF-{type}:</a:t>
+              <a:t>Spectral type</a:t>
             </a:r>
           </a:p>
           <a:p>
@@ -3495,7 +3500,7 @@
             </a:pPr>
             <a:r>
               <a:rPr lang="en-VN" sz="1100" dirty="0"/>
-              <a:t>CF-P: less cloudy </a:t>
+              <a:t>P: less cloudy </a:t>
             </a:r>
           </a:p>
           <a:p>
@@ -3505,7 +3510,7 @@
             </a:pPr>
             <a:r>
               <a:rPr lang="en-VN" sz="1100" dirty="0"/>
-              <a:t>CF-B: more cloudy</a:t>
+              <a:t>B: more cloudy</a:t>
             </a:r>
           </a:p>
           <a:p>
@@ -3515,7 +3520,7 @@
             </a:pPr>
             <a:r>
               <a:rPr lang="en-VN" sz="1100" dirty="0"/>
-              <a:t>CF-A: ambient atmosphere</a:t>
+              <a:t>A: ambient atmosphere</a:t>
             </a:r>
           </a:p>
         </p:txBody>
@@ -3555,7 +3560,7 @@
           <p:spPr>
             <a:xfrm>
               <a:off x="5491800" y="1446958"/>
-              <a:ext cx="2074890" cy="677108"/>
+              <a:ext cx="2074890" cy="584775"/>
             </a:xfrm>
             <a:prstGeom prst="rect">
               <a:avLst/>
@@ -3576,26 +3581,12 @@
               <a:pPr algn="ctr"/>
               <a:r>
                 <a:rPr lang="en-VN" sz="1600" dirty="0"/>
-                <a:t>CF-{type} at Np: </a:t>
+                <a:t>Spectral {type} </a:t>
               </a:r>
             </a:p>
             <a:p>
               <a:pPr algn="ctr"/>
-              <a:r>
-                <a:rPr lang="en-US" sz="1100" dirty="0"/>
-                <a:t>C</a:t>
-              </a:r>
-              <a:r>
-                <a:rPr lang="en-VN" sz="1100" dirty="0"/>
-                <a:t>ontrast determination</a:t>
-              </a:r>
-            </a:p>
-            <a:p>
-              <a:pPr algn="ctr"/>
-              <a:r>
-                <a:rPr lang="en-VN" sz="1100" dirty="0"/>
-                <a:t>Slant calculation at inclination</a:t>
-              </a:r>
+              <a:endParaRPr lang="en-VN" sz="1600" dirty="0"/>
             </a:p>
           </p:txBody>
         </p:sp>
@@ -3613,7 +3604,7 @@
           </p:nvSpPr>
           <p:spPr>
             <a:xfrm>
-              <a:off x="5491800" y="2255089"/>
+              <a:off x="5491799" y="2150693"/>
               <a:ext cx="2074889" cy="677108"/>
             </a:xfrm>
             <a:prstGeom prst="rect">
@@ -4158,50 +4149,11 @@
         <p:grpSpPr>
           <a:xfrm>
             <a:off x="9118973" y="1408742"/>
-            <a:ext cx="1461805" cy="3287401"/>
+            <a:ext cx="1339309" cy="3276959"/>
             <a:chOff x="4216706" y="497425"/>
-            <a:chExt cx="1461805" cy="3287401"/>
+            <a:chExt cx="1339309" cy="3276959"/>
           </a:xfrm>
         </p:grpSpPr>
-        <p:sp>
-          <p:nvSpPr>
-            <p:cNvPr id="10" name="TextBox 9">
-              <a:extLst>
-                <a:ext uri="{FF2B5EF4-FFF2-40B4-BE49-F238E27FC236}">
-                  <a16:creationId xmlns:a16="http://schemas.microsoft.com/office/drawing/2014/main" id="{954A0579-6039-D949-A089-21ABE0F6DA1C}"/>
-                </a:ext>
-              </a:extLst>
-            </p:cNvPr>
-            <p:cNvSpPr txBox="1"/>
-            <p:nvPr/>
-          </p:nvSpPr>
-          <p:spPr>
-            <a:xfrm>
-              <a:off x="4403417" y="763437"/>
-              <a:ext cx="1088383" cy="276999"/>
-            </a:xfrm>
-            <a:prstGeom prst="rect">
-              <a:avLst/>
-            </a:prstGeom>
-            <a:noFill/>
-            <a:ln>
-              <a:noFill/>
-            </a:ln>
-          </p:spPr>
-          <p:txBody>
-            <a:bodyPr wrap="square">
-              <a:spAutoFit/>
-            </a:bodyPr>
-            <a:lstStyle/>
-            <a:p>
-              <a:pPr algn="ctr"/>
-              <a:r>
-                <a:rPr lang="en-VN" sz="1200" dirty="0"/>
-                <a:t>for layer Np</a:t>
-              </a:r>
-            </a:p>
-          </p:txBody>
-        </p:sp>
         <p:sp>
           <p:nvSpPr>
             <p:cNvPr id="11" name="TextBox 10">
@@ -4263,7 +4215,7 @@
           </p:nvSpPr>
           <p:spPr>
             <a:xfrm>
-              <a:off x="4620119" y="1026499"/>
+              <a:off x="4497623" y="854272"/>
               <a:ext cx="1058392" cy="276999"/>
             </a:xfrm>
             <a:prstGeom prst="rect">
@@ -4330,45 +4282,6 @@
         </p:cxnSp>
         <p:cxnSp>
           <p:nvCxnSpPr>
-            <p:cNvPr id="29" name="Straight Connector 28">
-              <a:extLst>
-                <a:ext uri="{FF2B5EF4-FFF2-40B4-BE49-F238E27FC236}">
-                  <a16:creationId xmlns:a16="http://schemas.microsoft.com/office/drawing/2014/main" id="{0B523A12-3A2D-FF4C-A1D4-0F4869AC7DF2}"/>
-                </a:ext>
-              </a:extLst>
-            </p:cNvPr>
-            <p:cNvCxnSpPr>
-              <a:cxnSpLocks/>
-              <a:stCxn id="10" idx="1"/>
-            </p:cNvCxnSpPr>
-            <p:nvPr/>
-          </p:nvCxnSpPr>
-          <p:spPr>
-            <a:xfrm>
-              <a:off x="4403417" y="901937"/>
-              <a:ext cx="0" cy="2882889"/>
-            </a:xfrm>
-            <a:prstGeom prst="line">
-              <a:avLst/>
-            </a:prstGeom>
-          </p:spPr>
-          <p:style>
-            <a:lnRef idx="1">
-              <a:schemeClr val="dk1"/>
-            </a:lnRef>
-            <a:fillRef idx="0">
-              <a:schemeClr val="dk1"/>
-            </a:fillRef>
-            <a:effectRef idx="0">
-              <a:schemeClr val="dk1"/>
-            </a:effectRef>
-            <a:fontRef idx="minor">
-              <a:schemeClr val="tx1"/>
-            </a:fontRef>
-          </p:style>
-        </p:cxnSp>
-        <p:cxnSp>
-          <p:nvCxnSpPr>
             <p:cNvPr id="31" name="Straight Connector 30">
               <a:extLst>
                 <a:ext uri="{FF2B5EF4-FFF2-40B4-BE49-F238E27FC236}">
@@ -4384,7 +4297,7 @@
           </p:nvCxnSpPr>
           <p:spPr>
             <a:xfrm>
-              <a:off x="4620119" y="1164999"/>
+              <a:off x="4497623" y="992772"/>
               <a:ext cx="0" cy="2619609"/>
             </a:xfrm>
             <a:prstGeom prst="line">
@@ -4568,8 +4481,8 @@
         </p:nvCxnSpPr>
         <p:spPr>
           <a:xfrm>
-            <a:off x="7297669" y="4190179"/>
-            <a:ext cx="0" cy="321960"/>
+            <a:off x="7297669" y="3933064"/>
+            <a:ext cx="0" cy="579075"/>
           </a:xfrm>
           <a:prstGeom prst="straightConnector1">
             <a:avLst/>
@@ -5258,9 +5171,9 @@
             <p:nvPr/>
           </p:nvCxnSpPr>
           <p:spPr>
-            <a:xfrm>
-              <a:off x="8591792" y="2676093"/>
-              <a:ext cx="1220496" cy="0"/>
+            <a:xfrm flipV="1">
+              <a:off x="8591792" y="2629927"/>
+              <a:ext cx="1220496" cy="46167"/>
             </a:xfrm>
             <a:prstGeom prst="straightConnector1">
               <a:avLst/>
@@ -5357,10 +5270,10 @@
         </p:nvGrpSpPr>
         <p:grpSpPr>
           <a:xfrm>
-            <a:off x="1936711" y="477654"/>
-            <a:ext cx="2034792" cy="2025769"/>
+            <a:off x="1196748" y="226244"/>
+            <a:ext cx="2771937" cy="2499397"/>
             <a:chOff x="279340" y="541762"/>
-            <a:chExt cx="2070872" cy="1922735"/>
+            <a:chExt cx="1840504" cy="1922735"/>
           </a:xfrm>
         </p:grpSpPr>
         <p:pic>
@@ -5385,8 +5298,8 @@
           </p:blipFill>
           <p:spPr>
             <a:xfrm>
-              <a:off x="460996" y="541762"/>
-              <a:ext cx="1889216" cy="1895577"/>
+              <a:off x="460997" y="541762"/>
+              <a:ext cx="1658847" cy="1895577"/>
             </a:xfrm>
             <a:prstGeom prst="rect">
               <a:avLst/>
@@ -5431,10 +5344,10 @@
       </p:grpSp>
       <p:grpSp>
         <p:nvGrpSpPr>
-          <p:cNvPr id="190" name="Group 189">
+          <p:cNvPr id="173" name="Group 172">
             <a:extLst>
               <a:ext uri="{FF2B5EF4-FFF2-40B4-BE49-F238E27FC236}">
-                <a16:creationId xmlns:a16="http://schemas.microsoft.com/office/drawing/2014/main" id="{7ED94EB2-981E-C64B-B833-CD6649F799E8}"/>
+                <a16:creationId xmlns:a16="http://schemas.microsoft.com/office/drawing/2014/main" id="{0848F026-01CB-B347-BFDE-F5BE98E3B0FE}"/>
               </a:ext>
             </a:extLst>
           </p:cNvPr>
@@ -5443,103 +5356,18 @@
         </p:nvGrpSpPr>
         <p:grpSpPr>
           <a:xfrm>
-            <a:off x="209409" y="3029482"/>
-            <a:ext cx="2938111" cy="4105553"/>
-            <a:chOff x="593902" y="3026807"/>
-            <a:chExt cx="2938111" cy="4105553"/>
+            <a:off x="455067" y="3028934"/>
+            <a:ext cx="4654557" cy="3104831"/>
+            <a:chOff x="498124" y="2714916"/>
+            <a:chExt cx="2938111" cy="1964347"/>
           </a:xfrm>
         </p:grpSpPr>
-        <p:grpSp>
-          <p:nvGrpSpPr>
-            <p:cNvPr id="173" name="Group 172">
+        <p:pic>
+          <p:nvPicPr>
+            <p:cNvPr id="169" name="Picture 168">
               <a:extLst>
                 <a:ext uri="{FF2B5EF4-FFF2-40B4-BE49-F238E27FC236}">
-                  <a16:creationId xmlns:a16="http://schemas.microsoft.com/office/drawing/2014/main" id="{0848F026-01CB-B347-BFDE-F5BE98E3B0FE}"/>
-                </a:ext>
-              </a:extLst>
-            </p:cNvPr>
-            <p:cNvGrpSpPr/>
-            <p:nvPr/>
-          </p:nvGrpSpPr>
-          <p:grpSpPr>
-            <a:xfrm>
-              <a:off x="593902" y="3026807"/>
-              <a:ext cx="2938111" cy="1964347"/>
-              <a:chOff x="498124" y="2714916"/>
-              <a:chExt cx="2938111" cy="1964347"/>
-            </a:xfrm>
-          </p:grpSpPr>
-          <p:pic>
-            <p:nvPicPr>
-              <p:cNvPr id="169" name="Picture 168">
-                <a:extLst>
-                  <a:ext uri="{FF2B5EF4-FFF2-40B4-BE49-F238E27FC236}">
-                    <a16:creationId xmlns:a16="http://schemas.microsoft.com/office/drawing/2014/main" id="{93323E8A-F965-C948-B466-DF035991CFF4}"/>
-                  </a:ext>
-                </a:extLst>
-              </p:cNvPr>
-              <p:cNvPicPr>
-                <a:picLocks noChangeAspect="1"/>
-              </p:cNvPicPr>
-              <p:nvPr/>
-            </p:nvPicPr>
-            <p:blipFill rotWithShape="1">
-              <a:blip r:embed="rId4"/>
-              <a:srcRect l="2429" t="26917" r="53506" b="2341"/>
-              <a:stretch/>
-            </p:blipFill>
-            <p:spPr>
-              <a:xfrm>
-                <a:off x="498124" y="2880434"/>
-                <a:ext cx="2938111" cy="1798829"/>
-              </a:xfrm>
-              <a:prstGeom prst="rect">
-                <a:avLst/>
-              </a:prstGeom>
-            </p:spPr>
-          </p:pic>
-          <p:sp>
-            <p:nvSpPr>
-              <p:cNvPr id="170" name="TextBox 169">
-                <a:extLst>
-                  <a:ext uri="{FF2B5EF4-FFF2-40B4-BE49-F238E27FC236}">
-                    <a16:creationId xmlns:a16="http://schemas.microsoft.com/office/drawing/2014/main" id="{9361B185-DB9A-FB4A-96C5-299E6A3CD738}"/>
-                  </a:ext>
-                </a:extLst>
-              </p:cNvPr>
-              <p:cNvSpPr txBox="1"/>
-              <p:nvPr/>
-            </p:nvSpPr>
-            <p:spPr>
-              <a:xfrm>
-                <a:off x="989843" y="2714916"/>
-                <a:ext cx="2236040" cy="253916"/>
-              </a:xfrm>
-              <a:prstGeom prst="rect">
-                <a:avLst/>
-              </a:prstGeom>
-              <a:noFill/>
-            </p:spPr>
-            <p:txBody>
-              <a:bodyPr wrap="square" rtlCol="0">
-                <a:spAutoFit/>
-              </a:bodyPr>
-              <a:lstStyle/>
-              <a:p>
-                <a:r>
-                  <a:rPr lang="en-VN" sz="1050" b="1" dirty="0"/>
-                  <a:t>Cloudfree contribution function</a:t>
-                </a:r>
-              </a:p>
-            </p:txBody>
-          </p:sp>
-        </p:grpSp>
-        <p:pic>
-          <p:nvPicPr>
-            <p:cNvPr id="172" name="Picture 171">
-              <a:extLst>
-                <a:ext uri="{FF2B5EF4-FFF2-40B4-BE49-F238E27FC236}">
-                  <a16:creationId xmlns:a16="http://schemas.microsoft.com/office/drawing/2014/main" id="{C45F609F-49A6-7546-ABA3-123C82A95A5F}"/>
+                  <a16:creationId xmlns:a16="http://schemas.microsoft.com/office/drawing/2014/main" id="{93323E8A-F965-C948-B466-DF035991CFF4}"/>
                 </a:ext>
               </a:extLst>
             </p:cNvPr>
@@ -5548,29 +5376,63 @@
             </p:cNvPicPr>
             <p:nvPr/>
           </p:nvPicPr>
-          <p:blipFill>
-            <a:blip r:embed="rId5"/>
-            <a:stretch>
-              <a:fillRect/>
-            </a:stretch>
+          <p:blipFill rotWithShape="1">
+            <a:blip r:embed="rId4"/>
+            <a:srcRect l="2429" t="26917" r="53506" b="2341"/>
+            <a:stretch/>
           </p:blipFill>
           <p:spPr>
             <a:xfrm>
-              <a:off x="745412" y="5138760"/>
-              <a:ext cx="2574155" cy="1993600"/>
+              <a:off x="498124" y="2880434"/>
+              <a:ext cx="2938111" cy="1798829"/>
             </a:xfrm>
             <a:prstGeom prst="rect">
               <a:avLst/>
             </a:prstGeom>
           </p:spPr>
         </p:pic>
+        <p:sp>
+          <p:nvSpPr>
+            <p:cNvPr id="170" name="TextBox 169">
+              <a:extLst>
+                <a:ext uri="{FF2B5EF4-FFF2-40B4-BE49-F238E27FC236}">
+                  <a16:creationId xmlns:a16="http://schemas.microsoft.com/office/drawing/2014/main" id="{9361B185-DB9A-FB4A-96C5-299E6A3CD738}"/>
+                </a:ext>
+              </a:extLst>
+            </p:cNvPr>
+            <p:cNvSpPr txBox="1"/>
+            <p:nvPr/>
+          </p:nvSpPr>
+          <p:spPr>
+            <a:xfrm>
+              <a:off x="989843" y="2714916"/>
+              <a:ext cx="2236040" cy="253916"/>
+            </a:xfrm>
+            <a:prstGeom prst="rect">
+              <a:avLst/>
+            </a:prstGeom>
+            <a:noFill/>
+          </p:spPr>
+          <p:txBody>
+            <a:bodyPr wrap="square" rtlCol="0">
+              <a:spAutoFit/>
+            </a:bodyPr>
+            <a:lstStyle/>
+            <a:p>
+              <a:r>
+                <a:rPr lang="en-VN" sz="1050" b="1" dirty="0"/>
+                <a:t>Cloudfree contribution function</a:t>
+              </a:r>
+            </a:p>
+          </p:txBody>
+        </p:sp>
       </p:grpSp>
       <p:grpSp>
         <p:nvGrpSpPr>
-          <p:cNvPr id="189" name="Group 188">
+          <p:cNvPr id="174" name="Group 173">
             <a:extLst>
               <a:ext uri="{FF2B5EF4-FFF2-40B4-BE49-F238E27FC236}">
-                <a16:creationId xmlns:a16="http://schemas.microsoft.com/office/drawing/2014/main" id="{429721DC-82A6-4F44-9F1F-CBF836BD96DD}"/>
+                <a16:creationId xmlns:a16="http://schemas.microsoft.com/office/drawing/2014/main" id="{F38D8A44-A77A-6F4B-B238-96CA0F0DCC54}"/>
               </a:ext>
             </a:extLst>
           </p:cNvPr>
@@ -5579,103 +5441,53 @@
         </p:nvGrpSpPr>
         <p:grpSpPr>
           <a:xfrm>
-            <a:off x="1243491" y="7569917"/>
-            <a:ext cx="3254768" cy="4222028"/>
+            <a:off x="423556" y="6427617"/>
+            <a:ext cx="4248807" cy="2982747"/>
             <a:chOff x="1562471" y="7459054"/>
-            <a:chExt cx="3254768" cy="4222028"/>
+            <a:chExt cx="3254768" cy="2162489"/>
           </a:xfrm>
         </p:grpSpPr>
-        <p:grpSp>
-          <p:nvGrpSpPr>
-            <p:cNvPr id="174" name="Group 173">
+        <p:sp>
+          <p:nvSpPr>
+            <p:cNvPr id="165" name="TextBox 164">
               <a:extLst>
                 <a:ext uri="{FF2B5EF4-FFF2-40B4-BE49-F238E27FC236}">
-                  <a16:creationId xmlns:a16="http://schemas.microsoft.com/office/drawing/2014/main" id="{F38D8A44-A77A-6F4B-B238-96CA0F0DCC54}"/>
+                  <a16:creationId xmlns:a16="http://schemas.microsoft.com/office/drawing/2014/main" id="{65B08AFA-8E82-DC4B-898C-B4A738C1614D}"/>
                 </a:ext>
               </a:extLst>
             </p:cNvPr>
-            <p:cNvGrpSpPr/>
+            <p:cNvSpPr txBox="1"/>
             <p:nvPr/>
-          </p:nvGrpSpPr>
-          <p:grpSpPr>
+          </p:nvSpPr>
+          <p:spPr>
             <a:xfrm>
-              <a:off x="1562471" y="7459054"/>
-              <a:ext cx="3254768" cy="2162489"/>
-              <a:chOff x="1562471" y="7459054"/>
-              <a:chExt cx="3254768" cy="2162489"/>
+              <a:off x="2301456" y="7459054"/>
+              <a:ext cx="1844665" cy="253916"/>
             </a:xfrm>
-          </p:grpSpPr>
-          <p:sp>
-            <p:nvSpPr>
-              <p:cNvPr id="165" name="TextBox 164">
-                <a:extLst>
-                  <a:ext uri="{FF2B5EF4-FFF2-40B4-BE49-F238E27FC236}">
-                    <a16:creationId xmlns:a16="http://schemas.microsoft.com/office/drawing/2014/main" id="{65B08AFA-8E82-DC4B-898C-B4A738C1614D}"/>
-                  </a:ext>
-                </a:extLst>
-              </p:cNvPr>
-              <p:cNvSpPr txBox="1"/>
-              <p:nvPr/>
-            </p:nvSpPr>
-            <p:spPr>
-              <a:xfrm>
-                <a:off x="2301456" y="7459054"/>
-                <a:ext cx="1844665" cy="253916"/>
-              </a:xfrm>
-              <a:prstGeom prst="rect">
-                <a:avLst/>
-              </a:prstGeom>
-              <a:noFill/>
-            </p:spPr>
-            <p:txBody>
-              <a:bodyPr wrap="square" rtlCol="0">
-                <a:spAutoFit/>
-              </a:bodyPr>
-              <a:lstStyle/>
-              <a:p>
-                <a:r>
-                  <a:rPr lang="en-VN" sz="1050" b="1" dirty="0"/>
-                  <a:t>Cloudy contribution function</a:t>
-                </a:r>
-              </a:p>
-            </p:txBody>
-          </p:sp>
-          <p:pic>
-            <p:nvPicPr>
-              <p:cNvPr id="168" name="Picture 167">
-                <a:extLst>
-                  <a:ext uri="{FF2B5EF4-FFF2-40B4-BE49-F238E27FC236}">
-                    <a16:creationId xmlns:a16="http://schemas.microsoft.com/office/drawing/2014/main" id="{1A93FC5F-1CA1-B442-ACBD-CAC792B436E5}"/>
-                  </a:ext>
-                </a:extLst>
-              </p:cNvPr>
-              <p:cNvPicPr>
-                <a:picLocks noChangeAspect="1"/>
-              </p:cNvPicPr>
-              <p:nvPr/>
-            </p:nvPicPr>
-            <p:blipFill rotWithShape="1">
-              <a:blip r:embed="rId4"/>
-              <a:srcRect l="54075" t="29266" r="2459" b="3899"/>
-              <a:stretch/>
-            </p:blipFill>
-            <p:spPr>
-              <a:xfrm>
-                <a:off x="1562471" y="7712970"/>
-                <a:ext cx="3254768" cy="1908573"/>
-              </a:xfrm>
-              <a:prstGeom prst="rect">
-                <a:avLst/>
-              </a:prstGeom>
-            </p:spPr>
-          </p:pic>
-        </p:grpSp>
+            <a:prstGeom prst="rect">
+              <a:avLst/>
+            </a:prstGeom>
+            <a:noFill/>
+          </p:spPr>
+          <p:txBody>
+            <a:bodyPr wrap="square" rtlCol="0">
+              <a:spAutoFit/>
+            </a:bodyPr>
+            <a:lstStyle/>
+            <a:p>
+              <a:r>
+                <a:rPr lang="en-VN" sz="1050" b="1" dirty="0"/>
+                <a:t>Cloudy contribution function</a:t>
+              </a:r>
+            </a:p>
+          </p:txBody>
+        </p:sp>
         <p:pic>
           <p:nvPicPr>
-            <p:cNvPr id="176" name="Picture 175">
+            <p:cNvPr id="168" name="Picture 167">
               <a:extLst>
                 <a:ext uri="{FF2B5EF4-FFF2-40B4-BE49-F238E27FC236}">
-                  <a16:creationId xmlns:a16="http://schemas.microsoft.com/office/drawing/2014/main" id="{5003CEFD-0B67-0642-9F0D-1453137BF4BC}"/>
+                  <a16:creationId xmlns:a16="http://schemas.microsoft.com/office/drawing/2014/main" id="{1A93FC5F-1CA1-B442-ACBD-CAC792B436E5}"/>
                 </a:ext>
               </a:extLst>
             </p:cNvPr>
@@ -5684,16 +5496,15 @@
             </p:cNvPicPr>
             <p:nvPr/>
           </p:nvPicPr>
-          <p:blipFill>
-            <a:blip r:embed="rId6"/>
-            <a:stretch>
-              <a:fillRect/>
-            </a:stretch>
+          <p:blipFill rotWithShape="1">
+            <a:blip r:embed="rId4"/>
+            <a:srcRect l="54075" t="29266" r="2459" b="3899"/>
+            <a:stretch/>
           </p:blipFill>
           <p:spPr>
             <a:xfrm>
-              <a:off x="1712141" y="9621543"/>
-              <a:ext cx="2662422" cy="2059539"/>
+              <a:off x="1562471" y="7712970"/>
+              <a:ext cx="3254768" cy="1908573"/>
             </a:xfrm>
             <a:prstGeom prst="rect">
               <a:avLst/>
@@ -5736,11 +5547,11 @@
             <p:nvPr/>
           </p:nvPicPr>
           <p:blipFill>
-            <a:blip r:embed="rId7">
+            <a:blip r:embed="rId5">
               <a:extLst>
                 <a:ext uri="{BEBA8EAE-BF5A-486C-A8C5-ECC9F3942E4B}">
                   <a14:imgProps xmlns:a14="http://schemas.microsoft.com/office/drawing/2010/main">
-                    <a14:imgLayer r:embed="rId8">
+                    <a14:imgLayer r:embed="rId6">
                       <a14:imgEffect>
                         <a14:backgroundRemoval t="5046" b="95872" l="2960" r="96106">
                           <a14:foregroundMark x1="48754" y1="5046" x2="48754" y2="5046"/>
@@ -5874,7 +5685,7 @@
               <p:nvPr/>
             </p:nvPicPr>
             <p:blipFill>
-              <a:blip r:embed="rId9"/>
+              <a:blip r:embed="rId7"/>
               <a:stretch>
                 <a:fillRect/>
               </a:stretch>
@@ -5904,7 +5715,7 @@
               <p:nvPr/>
             </p:nvPicPr>
             <p:blipFill>
-              <a:blip r:embed="rId10"/>
+              <a:blip r:embed="rId8"/>
               <a:stretch>
                 <a:fillRect/>
               </a:stretch>
@@ -5934,7 +5745,7 @@
               <p:nvPr/>
             </p:nvPicPr>
             <p:blipFill>
-              <a:blip r:embed="rId11"/>
+              <a:blip r:embed="rId9"/>
               <a:stretch>
                 <a:fillRect/>
               </a:stretch>
@@ -6025,7 +5836,7 @@
             <p:nvPr/>
           </p:nvPicPr>
           <p:blipFill rotWithShape="1">
-            <a:blip r:embed="rId12">
+            <a:blip r:embed="rId10">
               <a:duotone>
                 <a:prstClr val="black"/>
                 <a:schemeClr val="accent6">
@@ -6182,7 +5993,7 @@
           <p:nvPr/>
         </p:nvPicPr>
         <p:blipFill>
-          <a:blip r:embed="rId13"/>
+          <a:blip r:embed="rId11"/>
           <a:stretch>
             <a:fillRect/>
           </a:stretch>

</xml_diff>